<commit_message>
Updated Lifecyle Image and included the Lifecycle image files for historical purposes in a new Lifecycle Images folder
</commit_message>
<xml_diff>
--- a/Crawl Walk Talk_Slide Deck.pptx
+++ b/Crawl Walk Talk_Slide Deck.pptx
@@ -217,7 +217,7 @@
           <a:p>
             <a:fld id="{F9B0B765-6EFC-4E67-A609-5A2DD4CB2622}" type="datetimeFigureOut">
               <a:rPr lang="en-US" smtClean="0"/>
-              <a:t>3/3/2015</a:t>
+              <a:t>3/5/2015</a:t>
             </a:fld>
             <a:endParaRPr lang="en-US"/>
           </a:p>
@@ -4243,7 +4243,7 @@
       </p:grpSpPr>
       <p:pic>
         <p:nvPicPr>
-          <p:cNvPr id="13" name="Picture 12"/>
+          <p:cNvPr id="3" name="Picture 2"/>
           <p:cNvPicPr>
             <a:picLocks noChangeAspect="1"/>
           </p:cNvPicPr>
@@ -4263,8 +4263,8 @@
         </p:blipFill>
         <p:spPr>
           <a:xfrm>
-            <a:off x="0" y="0"/>
-            <a:ext cx="9511788" cy="6858000"/>
+            <a:off x="-139189" y="0"/>
+            <a:ext cx="9511789" cy="6858000"/>
           </a:xfrm>
           <a:prstGeom prst="rect">
             <a:avLst/>

</xml_diff>